<commit_message>
Update Week 13 Software Evolution.pptx
</commit_message>
<xml_diff>
--- a/Slides/Week 13 Software Evolution.pptx
+++ b/Slides/Week 13 Software Evolution.pptx
@@ -233,7 +233,7 @@
           <a:p>
             <a:fld id="{0FEC1AAB-5E7C-43B3-93F1-3B00C2708E32}" type="datetimeFigureOut">
               <a:rPr lang="th-TH" smtClean="0"/>
-              <a:t>19/11/61</a:t>
+              <a:t>07/11/62</a:t>
             </a:fld>
             <a:endParaRPr lang="th-TH"/>
           </a:p>
@@ -411,7 +411,7 @@
           <a:p>
             <a:fld id="{5B1B5456-0566-42F4-BCC8-DF5300E15663}" type="datetimeFigureOut">
               <a:rPr lang="th-TH" smtClean="0"/>
-              <a:t>19/11/61</a:t>
+              <a:t>07/11/62</a:t>
             </a:fld>
             <a:endParaRPr lang="th-TH"/>
           </a:p>
@@ -6637,7 +6637,7 @@
           <a:p>
             <a:r>
               <a:rPr lang="th-TH"/>
-              <a:t>2561.11.20</a:t>
+              <a:t>2562.11.08</a:t>
             </a:r>
           </a:p>
         </p:txBody>
@@ -6810,7 +6810,7 @@
           <a:p>
             <a:r>
               <a:rPr lang="th-TH"/>
-              <a:t>2561.11.20</a:t>
+              <a:t>2562.11.08</a:t>
             </a:r>
           </a:p>
         </p:txBody>
@@ -6993,7 +6993,7 @@
           <a:p>
             <a:r>
               <a:rPr lang="th-TH"/>
-              <a:t>2561.11.20</a:t>
+              <a:t>2562.11.08</a:t>
             </a:r>
           </a:p>
         </p:txBody>
@@ -7231,7 +7231,7 @@
           <a:p>
             <a:r>
               <a:rPr lang="th-TH"/>
-              <a:t>2561.11.20</a:t>
+              <a:t>2562.11.08</a:t>
             </a:r>
             <a:endParaRPr lang="th-TH" dirty="0"/>
           </a:p>
@@ -7502,7 +7502,7 @@
           <a:p>
             <a:r>
               <a:rPr lang="th-TH"/>
-              <a:t>2561.11.20</a:t>
+              <a:t>2562.11.08</a:t>
             </a:r>
           </a:p>
         </p:txBody>
@@ -7743,7 +7743,7 @@
           <a:p>
             <a:r>
               <a:rPr lang="th-TH"/>
-              <a:t>2561.11.20</a:t>
+              <a:t>2562.11.08</a:t>
             </a:r>
           </a:p>
         </p:txBody>
@@ -8113,7 +8113,7 @@
           <a:p>
             <a:r>
               <a:rPr lang="th-TH"/>
-              <a:t>2561.11.20</a:t>
+              <a:t>2562.11.08</a:t>
             </a:r>
           </a:p>
         </p:txBody>
@@ -8239,7 +8239,7 @@
           <a:p>
             <a:r>
               <a:rPr lang="th-TH"/>
-              <a:t>2561.11.20</a:t>
+              <a:t>2562.11.08</a:t>
             </a:r>
           </a:p>
         </p:txBody>
@@ -8337,7 +8337,7 @@
           <a:p>
             <a:r>
               <a:rPr lang="th-TH"/>
-              <a:t>2561.11.20</a:t>
+              <a:t>2562.11.08</a:t>
             </a:r>
           </a:p>
         </p:txBody>
@@ -8617,7 +8617,7 @@
           <a:p>
             <a:r>
               <a:rPr lang="th-TH"/>
-              <a:t>2561.11.20</a:t>
+              <a:t>2562.11.08</a:t>
             </a:r>
           </a:p>
         </p:txBody>
@@ -8877,7 +8877,7 @@
           <a:p>
             <a:r>
               <a:rPr lang="th-TH"/>
-              <a:t>2561.11.20</a:t>
+              <a:t>2562.11.08</a:t>
             </a:r>
           </a:p>
         </p:txBody>
@@ -9093,7 +9093,7 @@
           <a:p>
             <a:r>
               <a:rPr lang="th-TH"/>
-              <a:t>2561.11.20</a:t>
+              <a:t>2562.11.08</a:t>
             </a:r>
           </a:p>
         </p:txBody>
@@ -9822,7 +9822,7 @@
           <a:p>
             <a:r>
               <a:rPr lang="th-TH"/>
-              <a:t>2561.11.20</a:t>
+              <a:t>2562.11.08</a:t>
             </a:r>
             <a:endParaRPr lang="th-TH" dirty="0"/>
           </a:p>
@@ -10018,7 +10018,7 @@
           <a:p>
             <a:r>
               <a:rPr lang="th-TH"/>
-              <a:t>2561.11.20</a:t>
+              <a:t>2562.11.08</a:t>
             </a:r>
             <a:endParaRPr lang="th-TH" dirty="0"/>
           </a:p>
@@ -10214,7 +10214,7 @@
           <a:p>
             <a:r>
               <a:rPr lang="th-TH"/>
-              <a:t>2561.11.20</a:t>
+              <a:t>2562.11.08</a:t>
             </a:r>
             <a:endParaRPr lang="th-TH" dirty="0"/>
           </a:p>
@@ -10392,20 +10392,50 @@
                   <a:srgbClr val="3366FF"/>
                 </a:solidFill>
               </a:rPr>
-              <a:t>การเปลี่ยนแปลง</a:t>
-            </a:r>
-            <a:r>
-              <a:rPr lang="th-TH">
+              <a:t>การเปลี่ยนแปลงอย่างเร่งด่วน</a:t>
+            </a:r>
+            <a:r>
+              <a:rPr lang="en-US" dirty="0">
                 <a:solidFill>
                   <a:srgbClr val="3366FF"/>
                 </a:solidFill>
               </a:rPr>
-              <a:t>อย่างเร่งด่วน</a:t>
+              <a:t> </a:t>
+            </a:r>
+            <a:r>
+              <a:rPr lang="th-TH" dirty="0">
+                <a:solidFill>
+                  <a:srgbClr val="3366FF"/>
+                </a:solidFill>
+              </a:rPr>
+              <a:t>อาจต้องดำเนินการโดยไม่ต้องผ่านขั้นตอนทั้งหมดของกระบวนการวิศวกรรมซอฟต์แวร์</a:t>
+            </a:r>
+          </a:p>
+          <a:p>
+            <a:pPr marL="969963" lvl="1" indent="-512763"/>
+            <a:r>
+              <a:rPr lang="th-TH" dirty="0">
+                <a:solidFill>
+                  <a:srgbClr val="FF00FF"/>
+                </a:solidFill>
+              </a:rPr>
+              <a:t>หากมีข้อผิดพลาดร้ายแรงของระบบต้องได้รับการซ่อมแซมเพื่อให้สามารถใช้งานได้ตามปกติ</a:t>
+            </a:r>
+          </a:p>
+          <a:p>
+            <a:pPr marL="969963" lvl="1" indent="-512763"/>
+            <a:r>
+              <a:rPr lang="th-TH" dirty="0">
+                <a:solidFill>
+                  <a:srgbClr val="FF00FF"/>
+                </a:solidFill>
+              </a:rPr>
+              <a:t>หากการเปลี่ยนแปลงสภาพแวดล้อมของระบบ (เช่น</a:t>
             </a:r>
             <a:r>
               <a:rPr lang="en-US" dirty="0">
                 <a:solidFill>
-                  <a:srgbClr val="3366FF"/>
+                  <a:srgbClr val="FF00FF"/>
                 </a:solidFill>
               </a:rPr>
               <a:t> </a:t>
@@ -10413,72 +10443,26 @@
             <a:r>
               <a:rPr lang="th-TH" dirty="0">
                 <a:solidFill>
-                  <a:srgbClr val="3366FF"/>
-                </a:solidFill>
-              </a:rPr>
-              <a:t>อาจต้องดำเนินการโดยไม่ต้องผ่านขั้นตอนทั้งหมดของกระบวนการวิศวกรรมซอฟต์แวร์</a:t>
-            </a:r>
-          </a:p>
-          <a:p>
-            <a:pPr marL="969963" lvl="1" indent="-512763"/>
-            <a:r>
-              <a:rPr lang="th-TH" dirty="0">
-                <a:solidFill>
                   <a:srgbClr val="FF00FF"/>
                 </a:solidFill>
               </a:rPr>
-              <a:t>หากมีข้อผิดพลาดร้ายแรงของระบบต้องได้รับการซ่อมแซมเพื่อให้สามารถใช้งานได้ตามปกติ</a:t>
-            </a:r>
-          </a:p>
-          <a:p>
-            <a:pPr marL="969963" lvl="1" indent="-512763"/>
-            <a:r>
-              <a:rPr lang="th-TH" dirty="0">
+              <a:t>การอ</a:t>
+            </a:r>
+            <a:r>
+              <a:rPr lang="th-TH" dirty="0" err="1">
                 <a:solidFill>
                   <a:srgbClr val="FF00FF"/>
                 </a:solidFill>
               </a:rPr>
-              <a:t>หากการเปลี่ยนแปลงสภาพแวดล้อมของระบบ </a:t>
-            </a:r>
-            <a:r>
-              <a:rPr lang="th-TH">
+              <a:t>ัปเ</a:t>
+            </a:r>
+            <a:r>
+              <a:rPr lang="th-TH" dirty="0">
                 <a:solidFill>
                   <a:srgbClr val="FF00FF"/>
                 </a:solidFill>
               </a:rPr>
-              <a:t>(เช่น</a:t>
-            </a:r>
-            <a:r>
-              <a:rPr lang="en-US" dirty="0">
-                <a:solidFill>
-                  <a:srgbClr val="FF00FF"/>
-                </a:solidFill>
-              </a:rPr>
-              <a:t> </a:t>
-            </a:r>
-            <a:r>
-              <a:rPr lang="th-TH" dirty="0">
-                <a:solidFill>
-                  <a:srgbClr val="FF00FF"/>
-                </a:solidFill>
-              </a:rPr>
-              <a:t>การอ</a:t>
-            </a:r>
-            <a:r>
-              <a:rPr lang="th-TH" dirty="0" err="1">
-                <a:solidFill>
-                  <a:srgbClr val="FF00FF"/>
-                </a:solidFill>
-              </a:rPr>
-              <a:t>ัปเ</a:t>
-            </a:r>
-            <a:r>
-              <a:rPr lang="th-TH" dirty="0">
-                <a:solidFill>
-                  <a:srgbClr val="FF00FF"/>
-                </a:solidFill>
-              </a:rPr>
-              <a:t>กรดระบบปฏิบัติการ) มีผลกระทบที่ไม่คาดคิด</a:t>
+              <a:t>กรดระบบปฏิบัติการ) แล้วส่งผลกระทบที่ไม่คาดคิด</a:t>
             </a:r>
           </a:p>
           <a:p>
@@ -10546,7 +10530,7 @@
           <a:p>
             <a:r>
               <a:rPr lang="th-TH"/>
-              <a:t>2561.11.20</a:t>
+              <a:t>2562.11.08</a:t>
             </a:r>
             <a:endParaRPr lang="th-TH" dirty="0"/>
           </a:p>
@@ -10710,7 +10694,7 @@
           <a:p>
             <a:r>
               <a:rPr lang="th-TH"/>
-              <a:t>2561.11.20</a:t>
+              <a:t>2562.11.08</a:t>
             </a:r>
             <a:endParaRPr lang="th-TH" dirty="0"/>
           </a:p>
@@ -11124,7 +11108,7 @@
           <a:p>
             <a:r>
               <a:rPr lang="th-TH"/>
-              <a:t>2561.11.20</a:t>
+              <a:t>2562.11.08</a:t>
             </a:r>
             <a:endParaRPr lang="th-TH" dirty="0"/>
           </a:p>
@@ -11279,7 +11263,7 @@
           <a:p>
             <a:r>
               <a:rPr lang="th-TH"/>
-              <a:t>2561.11.20</a:t>
+              <a:t>2562.11.08</a:t>
             </a:r>
             <a:endParaRPr lang="th-TH" dirty="0"/>
           </a:p>
@@ -11493,12 +11477,23 @@
                   <a:srgbClr val="3366FF"/>
                 </a:solidFill>
               </a:rPr>
-              <a:t>ระบบเดิมไม่ได้เป็นเพียงระบบซอฟต์แวร์ แต่เป็นระบบทางด้านเทคนิคและสภาพแวดล้อมที่กว้างขึ้น ซึ่งรวมถึงฮาร์ดแวร์ซอฟต์แวร์ไลบรารี</a:t>
+              <a:t>ระบบเดิมไม่ได้เป็นเพียงระบบซอฟต์แวร์ แต่เป็นระบบทางด้านเทคนิคและสภาพแวดล้อมที่กว้างกว่า </a:t>
+            </a:r>
+          </a:p>
+          <a:p>
+            <a:pPr marL="969963" lvl="1" indent="-512763"/>
+            <a:r>
+              <a:rPr lang="th-TH" dirty="0">
+                <a:solidFill>
+                  <a:srgbClr val="FF00FF"/>
+                </a:solidFill>
+              </a:rPr>
+              <a:t>รวมถึงฮาร์ดแวร์ซอฟต์แวร์ไลบรารี</a:t>
             </a:r>
             <a:r>
               <a:rPr lang="th-TH" dirty="0" err="1">
                 <a:solidFill>
-                  <a:srgbClr val="3366FF"/>
+                  <a:srgbClr val="FF00FF"/>
                 </a:solidFill>
               </a:rPr>
               <a:t>่แ</a:t>
@@ -11506,16 +11501,22 @@
             <a:r>
               <a:rPr lang="th-TH" dirty="0">
                 <a:solidFill>
-                  <a:srgbClr val="3366FF"/>
-                </a:solidFill>
-              </a:rPr>
-              <a:t>ละซอฟต์แวร์สนับสนุน รวมทั้งกระบวนการทางธุรกิจอื่น ๆ</a:t>
-            </a:r>
-            <a:endParaRPr lang="th-TH" dirty="0">
-              <a:solidFill>
-                <a:srgbClr val="FF00FF"/>
-              </a:solidFill>
-            </a:endParaRPr>
+                  <a:srgbClr val="FF00FF"/>
+                </a:solidFill>
+              </a:rPr>
+              <a:t>ละซอฟต์แวร์สนับสนุน </a:t>
+            </a:r>
+          </a:p>
+          <a:p>
+            <a:pPr marL="969963" lvl="1" indent="-512763"/>
+            <a:r>
+              <a:rPr lang="th-TH" dirty="0">
+                <a:solidFill>
+                  <a:srgbClr val="FF00FF"/>
+                </a:solidFill>
+              </a:rPr>
+              <a:t>และกระบวนการทางธุรกิจอื่น ๆ</a:t>
+            </a:r>
           </a:p>
         </p:txBody>
       </p:sp>
@@ -11571,7 +11572,7 @@
           <a:p>
             <a:r>
               <a:rPr lang="th-TH"/>
-              <a:t>2561.11.20</a:t>
+              <a:t>2562.11.08</a:t>
             </a:r>
             <a:endParaRPr lang="th-TH" dirty="0"/>
           </a:p>
@@ -11767,7 +11768,7 @@
           <a:p>
             <a:r>
               <a:rPr lang="th-TH"/>
-              <a:t>2561.11.20</a:t>
+              <a:t>2562.11.08</a:t>
             </a:r>
             <a:endParaRPr lang="th-TH" dirty="0"/>
           </a:p>
@@ -11903,7 +11904,7 @@
         </p:spPr>
         <p:txBody>
           <a:bodyPr vert="horz" lIns="91440" tIns="45720" rIns="91440" bIns="45720" rtlCol="0">
-            <a:normAutofit fontScale="92500" lnSpcReduction="10000"/>
+            <a:normAutofit fontScale="92500" lnSpcReduction="20000"/>
           </a:bodyPr>
           <a:lstStyle/>
           <a:p>
@@ -11920,12 +11921,20 @@
           <a:p>
             <a:pPr marL="969963" lvl="1" indent="-512763"/>
             <a:r>
-              <a:rPr lang="th-TH" dirty="0">
+              <a:rPr lang="en-US" dirty="0">
                 <a:solidFill>
                   <a:srgbClr val="FF00FF"/>
                 </a:solidFill>
               </a:rPr>
-              <a:t>ระบบเดิมอาจถูกเขียนขึ้นสำหรับฮาร์ดแวร์ที่ไม่สามารถใช้งานได้อีกต่อไป</a:t>
+              <a:t>Legacy system</a:t>
+            </a:r>
+            <a:r>
+              <a:rPr lang="th-TH" dirty="0">
+                <a:solidFill>
+                  <a:srgbClr val="FF00FF"/>
+                </a:solidFill>
+              </a:rPr>
+              <a:t> อาจถูกเขียนขึ้นสำหรับฮาร์ดแวร์ที่ไม่สามารถใช้งานได้อีกต่อไป</a:t>
             </a:r>
           </a:p>
           <a:p>
@@ -11942,12 +11951,20 @@
           <a:p>
             <a:pPr marL="969963" lvl="1" indent="-512763"/>
             <a:r>
-              <a:rPr lang="th-TH" dirty="0">
+              <a:rPr lang="en-US" dirty="0">
                 <a:solidFill>
                   <a:srgbClr val="FF00FF"/>
                 </a:solidFill>
               </a:rPr>
-              <a:t>ระบบเดิมอาจมีซอฟต์แวร์สนับสนุนจำนวนมากที่ล้าสมัยหรือไม่ได้รับการสนับสนุนแล้ว</a:t>
+              <a:t>Legacy system</a:t>
+            </a:r>
+            <a:r>
+              <a:rPr lang="th-TH" dirty="0">
+                <a:solidFill>
+                  <a:srgbClr val="FF00FF"/>
+                </a:solidFill>
+              </a:rPr>
+              <a:t> อาจมีซอฟต์แวร์สนับสนุนจำนวนมากที่ล้าสมัยหรือไม่ได้รับการสนับสนุนแล้ว</a:t>
             </a:r>
           </a:p>
           <a:p>
@@ -12160,7 +12177,7 @@
           <a:p>
             <a:r>
               <a:rPr lang="th-TH"/>
-              <a:t>2561.11.20</a:t>
+              <a:t>2562.11.08</a:t>
             </a:r>
             <a:endParaRPr lang="th-TH" dirty="0"/>
           </a:p>
@@ -12369,7 +12386,7 @@
           <a:p>
             <a:r>
               <a:rPr lang="th-TH"/>
-              <a:t>2561.11.20</a:t>
+              <a:t>2562.11.08</a:t>
             </a:r>
             <a:endParaRPr lang="th-TH" dirty="0"/>
           </a:p>
@@ -12533,12 +12550,20 @@
           <a:p>
             <a:pPr marL="969963" lvl="1" indent="-512763"/>
             <a:r>
-              <a:rPr lang="th-TH" dirty="0">
+              <a:rPr lang="en-US" dirty="0">
                 <a:solidFill>
                   <a:srgbClr val="FF00FF"/>
                 </a:solidFill>
               </a:rPr>
-              <a:t>ระบบเดิมอาจได้รับการออกแบบมาให้ครอบคลุมระบบเดิมและมีฟังก์ชันการทำงานที่จำกัด</a:t>
+              <a:t>Legacy system </a:t>
+            </a:r>
+            <a:r>
+              <a:rPr lang="th-TH" dirty="0">
+                <a:solidFill>
+                  <a:srgbClr val="FF00FF"/>
+                </a:solidFill>
+              </a:rPr>
+              <a:t>อาจได้รับการออกแบบมาให้ครอบคลุมระบบเดิมและมีฟังก์ชันการทำงานที่จำกัด</a:t>
             </a:r>
           </a:p>
           <a:p>
@@ -12566,12 +12591,20 @@
           <a:p>
             <a:pPr marL="969963" lvl="1" indent="-512763"/>
             <a:r>
-              <a:rPr lang="th-TH" dirty="0">
+              <a:rPr lang="en-US" dirty="0">
                 <a:solidFill>
                   <a:srgbClr val="FF00FF"/>
                 </a:solidFill>
               </a:rPr>
-              <a:t>ระบบเดิมอาจอยู่ภายใต้นโยบายและกฎเหล่านั้น</a:t>
+              <a:t>Legacy system</a:t>
+            </a:r>
+            <a:r>
+              <a:rPr lang="th-TH" dirty="0">
+                <a:solidFill>
+                  <a:srgbClr val="FF00FF"/>
+                </a:solidFill>
+              </a:rPr>
+              <a:t> อาจอยู่ภายใต้นโยบายและกฎเหล่านั้น</a:t>
             </a:r>
           </a:p>
         </p:txBody>
@@ -12628,7 +12661,7 @@
           <a:p>
             <a:r>
               <a:rPr lang="th-TH"/>
-              <a:t>2561.11.20</a:t>
+              <a:t>2562.11.08</a:t>
             </a:r>
             <a:endParaRPr lang="th-TH" dirty="0"/>
           </a:p>
@@ -12792,7 +12825,7 @@
           <a:p>
             <a:r>
               <a:rPr lang="th-TH"/>
-              <a:t>2561.11.20</a:t>
+              <a:t>2562.11.08</a:t>
             </a:r>
             <a:endParaRPr lang="th-TH" dirty="0"/>
           </a:p>
@@ -12971,7 +13004,39 @@
                   <a:srgbClr val="3366FF"/>
                 </a:solidFill>
               </a:rPr>
-              <a:t>การแทนที่ระบบเดิมมีความเสี่ยงสูง แต่ก็มีราคาแพงเมื่อจะให้ธุรกิจยังคงใช้ระบบเหล่านี้ต่อไป</a:t>
+              <a:t>การแทนที่ </a:t>
+            </a:r>
+            <a:r>
+              <a:rPr lang="en-US" dirty="0">
+                <a:solidFill>
+                  <a:srgbClr val="3366FF"/>
+                </a:solidFill>
+              </a:rPr>
+              <a:t>Legacy system </a:t>
+            </a:r>
+            <a:r>
+              <a:rPr lang="th-TH" dirty="0">
+                <a:solidFill>
+                  <a:srgbClr val="3366FF"/>
+                </a:solidFill>
+              </a:rPr>
+              <a:t>มีความเสี่ยงสูง แต่ก็มีราคาแพงเมื่อจะให้ธุรกิจยังคงใช้ </a:t>
+            </a:r>
+            <a:r>
+              <a:rPr lang="en-US" dirty="0">
+                <a:solidFill>
+                  <a:srgbClr val="3366FF"/>
+                </a:solidFill>
+              </a:rPr>
+              <a:t>Legacy system </a:t>
+            </a:r>
+            <a:r>
+              <a:rPr lang="th-TH" dirty="0">
+                <a:solidFill>
+                  <a:srgbClr val="3366FF"/>
+                </a:solidFill>
+              </a:rPr>
+              <a:t>ต่อไป</a:t>
             </a:r>
           </a:p>
           <a:p>
@@ -13083,7 +13148,7 @@
           <a:p>
             <a:r>
               <a:rPr lang="th-TH"/>
-              <a:t>2561.11.20</a:t>
+              <a:t>2562.11.08</a:t>
             </a:r>
             <a:endParaRPr lang="th-TH" dirty="0"/>
           </a:p>
@@ -13230,7 +13295,23 @@
                   <a:srgbClr val="3366FF"/>
                 </a:solidFill>
               </a:rPr>
-              <a:t>การแทนที่ระบบเดิมมีต้นทุนสูงด้วยเหตุผลหลายประการ:</a:t>
+              <a:t>การแทนที่ </a:t>
+            </a:r>
+            <a:r>
+              <a:rPr lang="en-US" dirty="0">
+                <a:solidFill>
+                  <a:srgbClr val="3366FF"/>
+                </a:solidFill>
+              </a:rPr>
+              <a:t>Legacy system </a:t>
+            </a:r>
+            <a:r>
+              <a:rPr lang="th-TH" dirty="0">
+                <a:solidFill>
+                  <a:srgbClr val="3366FF"/>
+                </a:solidFill>
+              </a:rPr>
+              <a:t>มีต้นทุนสูงด้วยเหตุผลหลายประการ:</a:t>
             </a:r>
           </a:p>
           <a:p>
@@ -13285,31 +13366,15 @@
                   <a:srgbClr val="FF00FF"/>
                 </a:solidFill>
               </a:rPr>
-              <a:t>การเพิ่มประสิทธิภาพของ</a:t>
-            </a:r>
-            <a:r>
-              <a:rPr lang="th-TH">
+              <a:t>การเพิ่มประสิทธิภาพของโปรแกรม (</a:t>
+            </a:r>
+            <a:r>
+              <a:rPr lang="en-US" dirty="0">
                 <a:solidFill>
                   <a:srgbClr val="FF00FF"/>
                 </a:solidFill>
               </a:rPr>
-              <a:t>โปรแกรม (</a:t>
-            </a:r>
-            <a:r>
-              <a:rPr lang="en-US">
-                <a:solidFill>
-                  <a:srgbClr val="FF00FF"/>
-                </a:solidFill>
-              </a:rPr>
-              <a:t>Program </a:t>
-            </a:r>
-            <a:r>
-              <a:rPr lang="en-US" dirty="0">
-                <a:solidFill>
-                  <a:srgbClr val="FF00FF"/>
-                </a:solidFill>
-              </a:rPr>
-              <a:t>optimizations</a:t>
+              <a:t>Program optimizations</a:t>
             </a:r>
             <a:r>
               <a:rPr lang="th-TH" dirty="0">
@@ -13385,7 +13450,7 @@
           <a:p>
             <a:r>
               <a:rPr lang="th-TH"/>
-              <a:t>2561.11.20</a:t>
+              <a:t>2562.11.08</a:t>
             </a:r>
             <a:endParaRPr lang="th-TH" dirty="0"/>
           </a:p>
@@ -13532,7 +13597,23 @@
                   <a:srgbClr val="3366FF"/>
                 </a:solidFill>
               </a:rPr>
-              <a:t>องค์กรที่ใช้ระบบเดิมต้องเลือกกลยุทธ์สำหรับการพัฒนาระบบ ซึ่งอาจะเป็นได้ลายวิธี เช่น</a:t>
+              <a:t>องค์กรที่ใช้ </a:t>
+            </a:r>
+            <a:r>
+              <a:rPr lang="en-US" dirty="0">
+                <a:solidFill>
+                  <a:srgbClr val="3366FF"/>
+                </a:solidFill>
+              </a:rPr>
+              <a:t>Legacy system </a:t>
+            </a:r>
+            <a:r>
+              <a:rPr lang="th-TH" dirty="0">
+                <a:solidFill>
+                  <a:srgbClr val="3366FF"/>
+                </a:solidFill>
+              </a:rPr>
+              <a:t>ต้องเลือกกลยุทธ์สำหรับการพัฒนาระบบ ซึ่งอาจะเป็นได้ลายวิธี เช่น</a:t>
             </a:r>
           </a:p>
           <a:p>
@@ -13543,7 +13624,23 @@
                   <a:srgbClr val="FF00FF"/>
                 </a:solidFill>
               </a:rPr>
-              <a:t>บำรุงรักษาระบบเดิมต่อไป</a:t>
+              <a:t>บำรุงรักษา </a:t>
+            </a:r>
+            <a:r>
+              <a:rPr lang="en-US" dirty="0">
+                <a:solidFill>
+                  <a:srgbClr val="FF00FF"/>
+                </a:solidFill>
+              </a:rPr>
+              <a:t>Legacy system </a:t>
+            </a:r>
+            <a:r>
+              <a:rPr lang="th-TH" dirty="0">
+                <a:solidFill>
+                  <a:srgbClr val="FF00FF"/>
+                </a:solidFill>
+              </a:rPr>
+              <a:t>เดิมต่อไป</a:t>
             </a:r>
           </a:p>
           <a:p>
@@ -13554,7 +13651,23 @@
                   <a:srgbClr val="FF00FF"/>
                 </a:solidFill>
               </a:rPr>
-              <a:t>ปรับเปลี่ยนกระบวนการทางธุรกิจ เพื่อไม่จำเป็นต้องใช้ระบบเดิมอีกต่อไป</a:t>
+              <a:t>ปรับเปลี่ยนกระบวนการทางธุรกิจ เพื่อไม่จำเป็นต้องใช้ </a:t>
+            </a:r>
+            <a:r>
+              <a:rPr lang="en-US" dirty="0">
+                <a:solidFill>
+                  <a:srgbClr val="FF00FF"/>
+                </a:solidFill>
+              </a:rPr>
+              <a:t>Legacy system </a:t>
+            </a:r>
+            <a:r>
+              <a:rPr lang="th-TH" dirty="0">
+                <a:solidFill>
+                  <a:srgbClr val="FF00FF"/>
+                </a:solidFill>
+              </a:rPr>
+              <a:t>อีกต่อไป</a:t>
             </a:r>
           </a:p>
           <a:p>
@@ -13592,7 +13705,23 @@
                   <a:srgbClr val="FF00FF"/>
                 </a:solidFill>
               </a:rPr>
-              <a:t>แทนที่ระบบเดิมด้วยระบบใหม่</a:t>
+              <a:t>แทนที่ </a:t>
+            </a:r>
+            <a:r>
+              <a:rPr lang="en-US" dirty="0">
+                <a:solidFill>
+                  <a:srgbClr val="FF00FF"/>
+                </a:solidFill>
+              </a:rPr>
+              <a:t>Legacy system </a:t>
+            </a:r>
+            <a:r>
+              <a:rPr lang="th-TH" dirty="0">
+                <a:solidFill>
+                  <a:srgbClr val="FF00FF"/>
+                </a:solidFill>
+              </a:rPr>
+              <a:t>ด้วยระบบใหม่ทั้งหมด</a:t>
             </a:r>
           </a:p>
           <a:p>
@@ -13660,7 +13789,7 @@
           <a:p>
             <a:r>
               <a:rPr lang="th-TH"/>
-              <a:t>2561.11.20</a:t>
+              <a:t>2562.11.08</a:t>
             </a:r>
             <a:endParaRPr lang="th-TH" dirty="0"/>
           </a:p>
@@ -14146,7 +14275,7 @@
           <a:p>
             <a:r>
               <a:rPr lang="th-TH"/>
-              <a:t>2561.11.20</a:t>
+              <a:t>2562.11.08</a:t>
             </a:r>
             <a:endParaRPr lang="th-TH" dirty="0"/>
           </a:p>
@@ -14496,7 +14625,7 @@
           <a:p>
             <a:r>
               <a:rPr lang="th-TH"/>
-              <a:t>2561.11.20</a:t>
+              <a:t>2562.11.08</a:t>
             </a:r>
             <a:endParaRPr lang="th-TH" dirty="0"/>
           </a:p>
@@ -14777,7 +14906,7 @@
           <a:p>
             <a:r>
               <a:rPr lang="th-TH"/>
-              <a:t>2561.11.20</a:t>
+              <a:t>2562.11.08</a:t>
             </a:r>
             <a:endParaRPr lang="th-TH" dirty="0"/>
           </a:p>
@@ -15052,7 +15181,7 @@
           <a:p>
             <a:r>
               <a:rPr lang="th-TH"/>
-              <a:t>2561.11.20</a:t>
+              <a:t>2562.11.08</a:t>
             </a:r>
             <a:endParaRPr lang="th-TH" dirty="0"/>
           </a:p>
@@ -15362,7 +15491,7 @@
           <a:p>
             <a:r>
               <a:rPr lang="th-TH"/>
-              <a:t>2561.11.20</a:t>
+              <a:t>2562.11.08</a:t>
             </a:r>
             <a:endParaRPr lang="th-TH" dirty="0"/>
           </a:p>
@@ -15648,7 +15777,7 @@
           <a:p>
             <a:r>
               <a:rPr lang="th-TH"/>
-              <a:t>2561.11.20</a:t>
+              <a:t>2562.11.08</a:t>
             </a:r>
             <a:endParaRPr lang="th-TH" dirty="0"/>
           </a:p>
@@ -15812,7 +15941,7 @@
           <a:p>
             <a:r>
               <a:rPr lang="th-TH"/>
-              <a:t>2561.11.20</a:t>
+              <a:t>2562.11.08</a:t>
             </a:r>
             <a:endParaRPr lang="th-TH" dirty="0"/>
           </a:p>
@@ -16332,7 +16461,7 @@
           <a:p>
             <a:r>
               <a:rPr lang="th-TH"/>
-              <a:t>2561.11.20</a:t>
+              <a:t>2562.11.08</a:t>
             </a:r>
             <a:endParaRPr lang="th-TH" dirty="0"/>
           </a:p>
@@ -16779,7 +16908,7 @@
           <a:p>
             <a:r>
               <a:rPr lang="th-TH"/>
-              <a:t>2561.11.20</a:t>
+              <a:t>2562.11.08</a:t>
             </a:r>
             <a:endParaRPr lang="th-TH" dirty="0"/>
           </a:p>
@@ -17298,7 +17427,7 @@
           <a:p>
             <a:r>
               <a:rPr lang="th-TH"/>
-              <a:t>2561.11.20</a:t>
+              <a:t>2562.11.08</a:t>
             </a:r>
             <a:endParaRPr lang="th-TH" dirty="0"/>
           </a:p>
@@ -17777,7 +17906,7 @@
           <a:p>
             <a:r>
               <a:rPr lang="th-TH"/>
-              <a:t>2561.11.20</a:t>
+              <a:t>2562.11.08</a:t>
             </a:r>
             <a:endParaRPr lang="th-TH" dirty="0"/>
           </a:p>
@@ -18158,7 +18287,7 @@
           <a:p>
             <a:r>
               <a:rPr lang="th-TH"/>
-              <a:t>2561.11.20</a:t>
+              <a:t>2562.11.08</a:t>
             </a:r>
             <a:endParaRPr lang="th-TH" dirty="0"/>
           </a:p>
@@ -18492,7 +18621,7 @@
           <a:p>
             <a:r>
               <a:rPr lang="th-TH"/>
-              <a:t>2561.11.20</a:t>
+              <a:t>2562.11.08</a:t>
             </a:r>
             <a:endParaRPr lang="th-TH" dirty="0"/>
           </a:p>
@@ -18656,7 +18785,7 @@
           <a:p>
             <a:r>
               <a:rPr lang="th-TH"/>
-              <a:t>2561.11.20</a:t>
+              <a:t>2562.11.08</a:t>
             </a:r>
             <a:endParaRPr lang="th-TH" dirty="0"/>
           </a:p>
@@ -18952,7 +19081,7 @@
           <a:p>
             <a:r>
               <a:rPr lang="th-TH"/>
-              <a:t>2561.11.20</a:t>
+              <a:t>2562.11.08</a:t>
             </a:r>
             <a:endParaRPr lang="th-TH" dirty="0"/>
           </a:p>
@@ -19216,7 +19345,7 @@
           <a:p>
             <a:r>
               <a:rPr lang="th-TH"/>
-              <a:t>2561.11.20</a:t>
+              <a:t>2562.11.08</a:t>
             </a:r>
             <a:endParaRPr lang="th-TH" dirty="0"/>
           </a:p>
@@ -19385,10 +19514,18 @@
                   <a:srgbClr val="3366FF"/>
                 </a:solidFill>
               </a:rPr>
-              <a:t>งบประมาณของบริษัทขนาดใหญ่ มีไว้สำหรับการเปลี่ยนและพัฒนาซอฟต์แวร์ที่มีอยู่</a:t>
-            </a:r>
-            <a:r>
-              <a:rPr lang="th-TH" b="1" dirty="0">
+              <a:t>งบประมาณของบริษัทขนาดใหญ่ มีไว้สำหรับการเปลี่ยนและ</a:t>
+            </a:r>
+            <a:r>
+              <a:rPr lang="th-TH" dirty="0">
+                <a:solidFill>
+                  <a:srgbClr val="00B050"/>
+                </a:solidFill>
+              </a:rPr>
+              <a:t>พัฒนาซอฟต์แวร์ที่มีอยู่</a:t>
+            </a:r>
+            <a:r>
+              <a:rPr lang="th-TH" b="1" u="sng" dirty="0">
                 <a:solidFill>
                   <a:srgbClr val="3366FF"/>
                 </a:solidFill>
@@ -19401,13 +19538,16 @@
                   <a:srgbClr val="3366FF"/>
                 </a:solidFill>
               </a:rPr>
-              <a:t>การพัฒนาซอฟต์แวร์ใหม่</a:t>
-            </a:r>
-            <a:endParaRPr lang="th-TH" dirty="0">
-              <a:solidFill>
-                <a:srgbClr val="FF00FF"/>
-              </a:solidFill>
-            </a:endParaRPr>
+              <a:t>การ</a:t>
+            </a:r>
+            <a:r>
+              <a:rPr lang="th-TH" dirty="0">
+                <a:solidFill>
+                  <a:srgbClr val="9933FF"/>
+                </a:solidFill>
+              </a:rPr>
+              <a:t>พัฒนาซอฟต์แวร์ใหม่</a:t>
+            </a:r>
           </a:p>
         </p:txBody>
       </p:sp>
@@ -19463,7 +19603,7 @@
           <a:p>
             <a:r>
               <a:rPr lang="th-TH"/>
-              <a:t>2561.11.20</a:t>
+              <a:t>2562.11.08</a:t>
             </a:r>
             <a:endParaRPr lang="th-TH" dirty="0"/>
           </a:p>
@@ -19700,7 +19840,7 @@
           <a:p>
             <a:r>
               <a:rPr lang="th-TH"/>
-              <a:t>2561.11.20</a:t>
+              <a:t>2562.11.08</a:t>
             </a:r>
             <a:endParaRPr lang="th-TH" dirty="0"/>
           </a:p>
@@ -19864,7 +20004,7 @@
           <a:p>
             <a:r>
               <a:rPr lang="th-TH"/>
-              <a:t>2561.11.20</a:t>
+              <a:t>2562.11.08</a:t>
             </a:r>
             <a:endParaRPr lang="th-TH" dirty="0"/>
           </a:p>
@@ -20171,7 +20311,7 @@
           <a:p>
             <a:r>
               <a:rPr lang="th-TH"/>
-              <a:t>2561.11.20</a:t>
+              <a:t>2562.11.08</a:t>
             </a:r>
             <a:endParaRPr lang="th-TH" dirty="0"/>
           </a:p>
@@ -20402,7 +20542,7 @@
           <a:p>
             <a:r>
               <a:rPr lang="th-TH"/>
-              <a:t>2561.11.20</a:t>
+              <a:t>2562.11.08</a:t>
             </a:r>
             <a:endParaRPr lang="th-TH" dirty="0"/>
           </a:p>
@@ -20674,7 +20814,7 @@
           <a:p>
             <a:r>
               <a:rPr lang="th-TH"/>
-              <a:t>2561.11.20</a:t>
+              <a:t>2562.11.08</a:t>
             </a:r>
             <a:endParaRPr lang="th-TH" dirty="0"/>
           </a:p>
@@ -20838,7 +20978,7 @@
           <a:p>
             <a:r>
               <a:rPr lang="th-TH"/>
-              <a:t>2561.11.20</a:t>
+              <a:t>2562.11.08</a:t>
             </a:r>
             <a:endParaRPr lang="th-TH" dirty="0"/>
           </a:p>
@@ -21178,21 +21318,8 @@
                   <a:srgbClr val="FF00FF"/>
                 </a:solidFill>
               </a:rPr>
-              <a:t>จัดโครงสร้างโปรแกรมใ</a:t>
-            </a:r>
-            <a:r>
-              <a:rPr lang="th-TH" dirty="0" err="1">
-                <a:solidFill>
-                  <a:srgbClr val="FF00FF"/>
-                </a:solidFill>
-              </a:rPr>
-              <a:t>หม</a:t>
-            </a:r>
-            <a:endParaRPr lang="th-TH" dirty="0">
-              <a:solidFill>
-                <a:srgbClr val="FF00FF"/>
-              </a:solidFill>
-            </a:endParaRPr>
+              <a:t>จัดโครงสร้างโปรแกรมใหม่</a:t>
+            </a:r>
           </a:p>
           <a:p>
             <a:pPr marL="512763" indent="-512763"/>
@@ -21296,7 +21423,7 @@
           <a:p>
             <a:r>
               <a:rPr lang="th-TH"/>
-              <a:t>2561.11.20</a:t>
+              <a:t>2562.11.08</a:t>
             </a:r>
             <a:endParaRPr lang="th-TH" dirty="0"/>
           </a:p>
@@ -21460,7 +21587,7 @@
           <a:p>
             <a:r>
               <a:rPr lang="th-TH"/>
-              <a:t>2561.11.20</a:t>
+              <a:t>2562.11.08</a:t>
             </a:r>
             <a:endParaRPr lang="th-TH" dirty="0"/>
           </a:p>
@@ -21655,7 +21782,7 @@
           <a:p>
             <a:r>
               <a:rPr lang="th-TH"/>
-              <a:t>2561.11.20</a:t>
+              <a:t>2562.11.08</a:t>
             </a:r>
             <a:endParaRPr lang="th-TH" dirty="0"/>
           </a:p>
@@ -21726,7 +21853,7 @@
                   <a:srgbClr val="3366FF"/>
                 </a:solidFill>
               </a:rPr>
-              <a:t>คุณภาพของซอฟต์แวร์ที่จะปรับรื้อปรับระบบใหม่</a:t>
+              <a:t>คุณภาพของซอฟต์แวร์ที่จะปรับรื้อ/ปรับระบบใหม่</a:t>
             </a:r>
           </a:p>
           <a:p>
@@ -21903,7 +22030,7 @@
           <a:p>
             <a:r>
               <a:rPr lang="th-TH"/>
-              <a:t>2561.11.20</a:t>
+              <a:t>2562.11.08</a:t>
             </a:r>
             <a:endParaRPr lang="th-TH" dirty="0"/>
           </a:p>
@@ -22209,7 +22336,7 @@
           <a:p>
             <a:r>
               <a:rPr lang="th-TH"/>
-              <a:t>2561.11.20</a:t>
+              <a:t>2562.11.08</a:t>
             </a:r>
             <a:endParaRPr lang="th-TH" dirty="0"/>
           </a:p>
@@ -22405,7 +22532,7 @@
           <a:p>
             <a:r>
               <a:rPr lang="th-TH"/>
-              <a:t>2561.11.20</a:t>
+              <a:t>2562.11.08</a:t>
             </a:r>
             <a:endParaRPr lang="th-TH" dirty="0"/>
           </a:p>
@@ -22743,7 +22870,7 @@
           <a:p>
             <a:r>
               <a:rPr lang="th-TH"/>
-              <a:t>2561.11.20</a:t>
+              <a:t>2562.11.08</a:t>
             </a:r>
             <a:endParaRPr lang="th-TH" dirty="0"/>
           </a:p>
@@ -22814,15 +22941,23 @@
                   <a:srgbClr val="3366FF"/>
                 </a:solidFill>
               </a:rPr>
-              <a:t>รหัสที่ซ้ำ</a:t>
-            </a:r>
-            <a:r>
-              <a:rPr lang="th-TH">
+              <a:t>รหัสที่ซ้ำกัน (</a:t>
+            </a:r>
+            <a:r>
+              <a:rPr lang="en-US" dirty="0">
                 <a:solidFill>
                   <a:srgbClr val="3366FF"/>
                 </a:solidFill>
               </a:rPr>
-              <a:t>กัน (</a:t>
+              <a:t>Duplicate code</a:t>
+            </a:r>
+            <a:r>
+              <a:rPr lang="th-TH" dirty="0">
+                <a:solidFill>
+                  <a:srgbClr val="3366FF"/>
+                </a:solidFill>
+              </a:rPr>
+              <a:t>)</a:t>
             </a:r>
             <a:r>
               <a:rPr lang="en-US" dirty="0">
@@ -22830,37 +22965,92 @@
                   <a:srgbClr val="3366FF"/>
                 </a:solidFill>
               </a:rPr>
-              <a:t>Duplicate </a:t>
-            </a:r>
-            <a:r>
-              <a:rPr lang="en-US">
+              <a:t> </a:t>
+            </a:r>
+          </a:p>
+          <a:p>
+            <a:pPr marL="969963" lvl="1" indent="-512763"/>
+            <a:r>
+              <a:rPr lang="th-TH" dirty="0">
+                <a:solidFill>
+                  <a:srgbClr val="FF00FF"/>
+                </a:solidFill>
+              </a:rPr>
+              <a:t>รหัสเดียวกันหรือคล้ายกันมากอาจกระจัดกระจายอยู่ในตำแหน่งต่าง ๆ ของโปรแกรม ซึ่งสามารถนำออกและนำมาใช้เป็น </a:t>
+            </a:r>
+            <a:r>
+              <a:rPr lang="en-US" dirty="0">
+                <a:solidFill>
+                  <a:srgbClr val="FF00FF"/>
+                </a:solidFill>
+              </a:rPr>
+              <a:t>method </a:t>
+            </a:r>
+            <a:r>
+              <a:rPr lang="th-TH" dirty="0">
+                <a:solidFill>
+                  <a:srgbClr val="FF00FF"/>
+                </a:solidFill>
+              </a:rPr>
+              <a:t>หรือฟังก์ชันเดียวกัน</a:t>
+            </a:r>
+          </a:p>
+          <a:p>
+            <a:pPr marL="512763" indent="-512763"/>
+            <a:r>
+              <a:rPr lang="th-TH" dirty="0">
                 <a:solidFill>
                   <a:srgbClr val="3366FF"/>
                 </a:solidFill>
               </a:rPr>
-              <a:t>code</a:t>
-            </a:r>
-            <a:r>
-              <a:rPr lang="th-TH">
+              <a:t>เมธอดที่ยาวเกินไป (</a:t>
+            </a:r>
+            <a:r>
+              <a:rPr lang="en-US" dirty="0">
                 <a:solidFill>
                   <a:srgbClr val="3366FF"/>
                 </a:solidFill>
               </a:rPr>
+              <a:t>Long methods</a:t>
+            </a:r>
+            <a:r>
+              <a:rPr lang="th-TH" dirty="0">
+                <a:solidFill>
+                  <a:srgbClr val="3366FF"/>
+                </a:solidFill>
+              </a:rPr>
               <a:t>)</a:t>
             </a:r>
-            <a:r>
-              <a:rPr lang="en-US">
+          </a:p>
+          <a:p>
+            <a:pPr marL="969963" lvl="1" indent="-512763"/>
+            <a:r>
+              <a:rPr lang="th-TH" dirty="0">
+                <a:solidFill>
+                  <a:srgbClr val="FF00FF"/>
+                </a:solidFill>
+              </a:rPr>
+              <a:t>หากเมธอดยาวเกินไปควรแยกออกเป็นเมธอดที่สั้นลง</a:t>
+            </a:r>
+          </a:p>
+          <a:p>
+            <a:pPr marL="512763" indent="-512763"/>
+            <a:r>
+              <a:rPr lang="th-TH" dirty="0">
                 <a:solidFill>
                   <a:srgbClr val="3366FF"/>
                 </a:solidFill>
               </a:rPr>
-              <a:t> </a:t>
-            </a:r>
-            <a:endParaRPr lang="en-US" dirty="0">
-              <a:solidFill>
-                <a:srgbClr val="3366FF"/>
-              </a:solidFill>
-            </a:endParaRPr>
+              <a:t>คำสั่ง </a:t>
+            </a:r>
+            <a:r>
+              <a:rPr lang="en-US" dirty="0">
+                <a:solidFill>
+                  <a:srgbClr val="3366FF"/>
+                </a:solidFill>
+              </a:rPr>
+              <a:t>Switch (case)</a:t>
+            </a:r>
           </a:p>
           <a:p>
             <a:pPr marL="969963" lvl="1" indent="-512763"/>
@@ -22870,15 +23060,23 @@
                   <a:srgbClr val="FF00FF"/>
                 </a:solidFill>
               </a:rPr>
-              <a:t>รหัสเดียวกันหรือคล้ายกันมากอาจกระจัดกระจายอยู่ในตำแหน่งต่าง ๆ ของโปรแกรม ซึ่งสามารถนำออกและนำมาใช้</a:t>
-            </a:r>
-            <a:r>
-              <a:rPr lang="th-TH">
+              <a:t>คำสั่ง </a:t>
+            </a:r>
+            <a:r>
+              <a:rPr lang="en-US" dirty="0">
                 <a:solidFill>
                   <a:srgbClr val="FF00FF"/>
                 </a:solidFill>
               </a:rPr>
-              <a:t>เป็น </a:t>
+              <a:t>switch </a:t>
+            </a:r>
+            <a:r>
+              <a:rPr lang="th-TH" dirty="0">
+                <a:solidFill>
+                  <a:srgbClr val="FF00FF"/>
+                </a:solidFill>
+              </a:rPr>
+              <a:t>อาจกระจายอยู่ทั่วโปรแกรม ในภาษาเชิงวัตถุมักจะสามารถใช้ </a:t>
             </a:r>
             <a:r>
               <a:rPr lang="en-US" dirty="0">
@@ -22886,7 +23084,7 @@
                   <a:srgbClr val="FF00FF"/>
                 </a:solidFill>
               </a:rPr>
-              <a:t>method </a:t>
+              <a:t>polymorphism </a:t>
             </a:r>
             <a:r>
               <a:rPr lang="th-TH" dirty="0">
@@ -22894,131 +23092,7 @@
                   <a:srgbClr val="FF00FF"/>
                 </a:solidFill>
               </a:rPr>
-              <a:t>หรือฟังก์ชันเดียวกัน</a:t>
-            </a:r>
-          </a:p>
-          <a:p>
-            <a:pPr marL="512763" indent="-512763"/>
-            <a:r>
-              <a:rPr lang="th-TH" dirty="0">
-                <a:solidFill>
-                  <a:srgbClr val="3366FF"/>
-                </a:solidFill>
-              </a:rPr>
-              <a:t>เมธอดที่ยาว</a:t>
-            </a:r>
-            <a:r>
-              <a:rPr lang="th-TH">
-                <a:solidFill>
-                  <a:srgbClr val="3366FF"/>
-                </a:solidFill>
-              </a:rPr>
-              <a:t>เกินไป (</a:t>
-            </a:r>
-            <a:r>
-              <a:rPr lang="en-US" dirty="0">
-                <a:solidFill>
-                  <a:srgbClr val="3366FF"/>
-                </a:solidFill>
-              </a:rPr>
-              <a:t>Long methods</a:t>
-            </a:r>
-            <a:r>
-              <a:rPr lang="th-TH" dirty="0">
-                <a:solidFill>
-                  <a:srgbClr val="3366FF"/>
-                </a:solidFill>
-              </a:rPr>
-              <a:t>)</a:t>
-            </a:r>
-          </a:p>
-          <a:p>
-            <a:pPr marL="969963" lvl="1" indent="-512763"/>
-            <a:r>
-              <a:rPr lang="th-TH" dirty="0">
-                <a:solidFill>
-                  <a:srgbClr val="FF00FF"/>
-                </a:solidFill>
-              </a:rPr>
-              <a:t>หากเมธอดเกินไปควรออกแบบใหม่ด้วยเมธอดที่สั้นกว่า</a:t>
-            </a:r>
-          </a:p>
-          <a:p>
-            <a:pPr marL="512763" indent="-512763"/>
-            <a:r>
-              <a:rPr lang="th-TH">
-                <a:solidFill>
-                  <a:srgbClr val="3366FF"/>
-                </a:solidFill>
-              </a:rPr>
-              <a:t>คำสั่ง </a:t>
-            </a:r>
-            <a:r>
-              <a:rPr lang="en-US" dirty="0">
-                <a:solidFill>
-                  <a:srgbClr val="3366FF"/>
-                </a:solidFill>
-              </a:rPr>
-              <a:t>Switch (case)</a:t>
-            </a:r>
-          </a:p>
-          <a:p>
-            <a:pPr marL="969963" lvl="1" indent="-512763"/>
-            <a:r>
-              <a:rPr lang="th-TH">
-                <a:solidFill>
-                  <a:srgbClr val="FF00FF"/>
-                </a:solidFill>
-              </a:rPr>
-              <a:t>คำสั่ง </a:t>
-            </a:r>
-            <a:r>
-              <a:rPr lang="en-US" dirty="0">
-                <a:solidFill>
-                  <a:srgbClr val="FF00FF"/>
-                </a:solidFill>
-              </a:rPr>
-              <a:t>switch </a:t>
-            </a:r>
-            <a:r>
-              <a:rPr lang="th-TH" dirty="0">
-                <a:solidFill>
-                  <a:srgbClr val="FF00FF"/>
-                </a:solidFill>
-              </a:rPr>
-              <a:t>อาจกระจายอยู่ทั่วโปรแกรม ในภาษาเชิงวัตถุมักจะสามารถ</a:t>
-            </a:r>
-            <a:r>
-              <a:rPr lang="th-TH">
-                <a:solidFill>
-                  <a:srgbClr val="FF00FF"/>
-                </a:solidFill>
-              </a:rPr>
-              <a:t>ใช้ </a:t>
-            </a:r>
-            <a:r>
-              <a:rPr lang="en-US" dirty="0">
-                <a:solidFill>
-                  <a:srgbClr val="FF00FF"/>
-                </a:solidFill>
-              </a:rPr>
-              <a:t>polymorphism </a:t>
-            </a:r>
-            <a:r>
-              <a:rPr lang="th-TH" dirty="0">
-                <a:solidFill>
-                  <a:srgbClr val="FF00FF"/>
-                </a:solidFill>
-              </a:rPr>
-              <a:t>เพื่อตอบสนองสิ่ง</a:t>
-            </a:r>
-            <a:r>
-              <a:rPr lang="th-TH">
-                <a:solidFill>
-                  <a:srgbClr val="FF00FF"/>
-                </a:solidFill>
-              </a:rPr>
-              <a:t>เดียวกันนี้</a:t>
+              <a:t>เพื่อตอบสนองสิ่งเดียวกันนี้</a:t>
             </a:r>
             <a:endParaRPr lang="en-US" dirty="0">
               <a:solidFill>
@@ -23156,7 +23230,7 @@
           <a:p>
             <a:r>
               <a:rPr lang="th-TH"/>
-              <a:t>2561.11.20</a:t>
+              <a:t>2562.11.08</a:t>
             </a:r>
             <a:endParaRPr lang="th-TH" dirty="0"/>
           </a:p>
@@ -23227,34 +23301,18 @@
                   <a:srgbClr val="3366FF"/>
                 </a:solidFill>
               </a:rPr>
-              <a:t>ข้อมูลรวมกันเป็นก้อน </a:t>
-            </a:r>
-            <a:r>
-              <a:rPr lang="th-TH">
+              <a:t>ข้อมูลรวมกันเป็นก้อน ๆ (</a:t>
+            </a:r>
+            <a:r>
+              <a:rPr lang="en-US" dirty="0">
                 <a:solidFill>
                   <a:srgbClr val="3366FF"/>
                 </a:solidFill>
               </a:rPr>
-              <a:t>ๆ (</a:t>
-            </a:r>
-            <a:r>
-              <a:rPr lang="en-US" dirty="0">
-                <a:solidFill>
-                  <a:srgbClr val="3366FF"/>
-                </a:solidFill>
-              </a:rPr>
-              <a:t>Data </a:t>
-            </a:r>
-            <a:r>
-              <a:rPr lang="en-US">
-                <a:solidFill>
-                  <a:srgbClr val="3366FF"/>
-                </a:solidFill>
-              </a:rPr>
-              <a:t>clumping</a:t>
-            </a:r>
-            <a:r>
-              <a:rPr lang="th-TH">
+              <a:t>Data clumping</a:t>
+            </a:r>
+            <a:r>
+              <a:rPr lang="th-TH" dirty="0">
                 <a:solidFill>
                   <a:srgbClr val="3366FF"/>
                 </a:solidFill>
@@ -23286,93 +23344,61 @@
                   <a:srgbClr val="FF00FF"/>
                 </a:solidFill>
               </a:rPr>
-              <a:t>กลุ่มข้อมูลเหล่านี้มักจะถูกแทนที่ด้วยวัตถุ</a:t>
-            </a:r>
-            <a:r>
-              <a:rPr lang="th-TH">
+              <a:t>กลุ่มข้อมูลเหล่านี้มักจะถูกแทนที่ด้วยวัตถุที่ </a:t>
+            </a:r>
+            <a:r>
+              <a:rPr lang="en-US" dirty="0">
                 <a:solidFill>
                   <a:srgbClr val="FF00FF"/>
                 </a:solidFill>
               </a:rPr>
-              <a:t>ที่ </a:t>
+              <a:t>encapsulates </a:t>
+            </a:r>
+            <a:r>
+              <a:rPr lang="th-TH" dirty="0">
+                <a:solidFill>
+                  <a:srgbClr val="FF00FF"/>
+                </a:solidFill>
+              </a:rPr>
+              <a:t>ข้อมูลทั้งหมด</a:t>
+            </a:r>
+          </a:p>
+          <a:p>
+            <a:pPr marL="512763" indent="-512763"/>
+            <a:r>
+              <a:rPr lang="th-TH" dirty="0">
+                <a:solidFill>
+                  <a:srgbClr val="3366FF"/>
+                </a:solidFill>
+              </a:rPr>
+              <a:t>การคาดเดา (</a:t>
             </a:r>
             <a:r>
               <a:rPr lang="en-US" dirty="0">
                 <a:solidFill>
+                  <a:srgbClr val="3366FF"/>
+                </a:solidFill>
+              </a:rPr>
+              <a:t>Speculative generality</a:t>
+            </a:r>
+            <a:r>
+              <a:rPr lang="th-TH" dirty="0">
+                <a:solidFill>
+                  <a:srgbClr val="3366FF"/>
+                </a:solidFill>
+              </a:rPr>
+              <a:t>)</a:t>
+            </a:r>
+          </a:p>
+          <a:p>
+            <a:pPr marL="969963" lvl="1" indent="-512763"/>
+            <a:r>
+              <a:rPr lang="th-TH" dirty="0">
+                <a:solidFill>
                   <a:srgbClr val="FF00FF"/>
                 </a:solidFill>
               </a:rPr>
-              <a:t>encapsulates </a:t>
-            </a:r>
-            <a:r>
-              <a:rPr lang="th-TH" dirty="0">
-                <a:solidFill>
-                  <a:srgbClr val="FF00FF"/>
-                </a:solidFill>
-              </a:rPr>
-              <a:t>ข้อมูลทั้งหมด</a:t>
-            </a:r>
-          </a:p>
-          <a:p>
-            <a:pPr marL="512763" indent="-512763"/>
-            <a:r>
-              <a:rPr lang="th-TH" dirty="0">
-                <a:solidFill>
-                  <a:srgbClr val="3366FF"/>
-                </a:solidFill>
-              </a:rPr>
-              <a:t>การคาด</a:t>
-            </a:r>
-            <a:r>
-              <a:rPr lang="th-TH">
-                <a:solidFill>
-                  <a:srgbClr val="3366FF"/>
-                </a:solidFill>
-              </a:rPr>
-              <a:t>เดา (</a:t>
-            </a:r>
-            <a:r>
-              <a:rPr lang="en-US">
-                <a:solidFill>
-                  <a:srgbClr val="3366FF"/>
-                </a:solidFill>
-              </a:rPr>
-              <a:t>Speculative </a:t>
-            </a:r>
-            <a:r>
-              <a:rPr lang="en-US" dirty="0">
-                <a:solidFill>
-                  <a:srgbClr val="3366FF"/>
-                </a:solidFill>
-              </a:rPr>
-              <a:t>generality</a:t>
-            </a:r>
-            <a:r>
-              <a:rPr lang="th-TH" dirty="0">
-                <a:solidFill>
-                  <a:srgbClr val="3366FF"/>
-                </a:solidFill>
-              </a:rPr>
-              <a:t>)</a:t>
-            </a:r>
-          </a:p>
-          <a:p>
-            <a:pPr marL="969963" lvl="1" indent="-512763"/>
-            <a:r>
-              <a:rPr lang="th-TH" dirty="0">
-                <a:solidFill>
-                  <a:srgbClr val="FF00FF"/>
-                </a:solidFill>
-              </a:rPr>
-              <a:t>กรณีนี้เกิดขึ้นเมื่อนักพัฒนาซอฟต์แวร์เขียนโค้ดเผื่อไว้สำหรับความต้องการในอนาคต กรณีนี้มักจะสามารถลบ</a:t>
-            </a:r>
-            <a:r>
-              <a:rPr lang="th-TH">
-                <a:solidFill>
-                  <a:srgbClr val="FF00FF"/>
-                </a:solidFill>
-              </a:rPr>
-              <a:t>ออกไปได้</a:t>
+              <a:t>กรณีนี้เกิดขึ้นเมื่อนักพัฒนาซอฟต์แวร์เขียนโค้ดเผื่อไว้สำหรับความต้องการในอนาคต กรณีนี้มักจะสามารถลบออกไปได้</a:t>
             </a:r>
             <a:endParaRPr lang="en-US" dirty="0">
               <a:solidFill>
@@ -23756,7 +23782,7 @@
           <a:p>
             <a:r>
               <a:rPr lang="th-TH"/>
-              <a:t>2561.11.20</a:t>
+              <a:t>2562.11.08</a:t>
             </a:r>
             <a:endParaRPr lang="th-TH" dirty="0"/>
           </a:p>
@@ -24186,7 +24212,7 @@
           <a:p>
             <a:r>
               <a:rPr lang="th-TH"/>
-              <a:t>2561.11.20</a:t>
+              <a:t>2562.11.08</a:t>
             </a:r>
             <a:endParaRPr lang="th-TH" dirty="0"/>
           </a:p>
@@ -24447,7 +24473,7 @@
           <a:p>
             <a:r>
               <a:rPr lang="th-TH"/>
-              <a:t>2561.11.20</a:t>
+              <a:t>2562.11.08</a:t>
             </a:r>
             <a:endParaRPr lang="th-TH" dirty="0"/>
           </a:p>
@@ -24629,7 +24655,7 @@
           <a:p>
             <a:r>
               <a:rPr lang="th-TH"/>
-              <a:t>2561.11.20</a:t>
+              <a:t>2562.11.08</a:t>
             </a:r>
             <a:endParaRPr lang="th-TH" dirty="0"/>
           </a:p>
@@ -24793,7 +24819,7 @@
           <a:p>
             <a:r>
               <a:rPr lang="th-TH"/>
-              <a:t>2561.11.20</a:t>
+              <a:t>2562.11.08</a:t>
             </a:r>
             <a:endParaRPr lang="th-TH" dirty="0"/>
           </a:p>
@@ -24961,7 +24987,7 @@
         </p:spPr>
         <p:txBody>
           <a:bodyPr vert="horz" lIns="91440" tIns="45720" rIns="91440" bIns="45720" rtlCol="0">
-            <a:normAutofit lnSpcReduction="10000"/>
+            <a:normAutofit fontScale="92500" lnSpcReduction="10000"/>
           </a:bodyPr>
           <a:lstStyle/>
           <a:p>
@@ -25047,12 +25073,34 @@
                   <a:srgbClr val="FF00FF"/>
                 </a:solidFill>
               </a:rPr>
-              <a:t>ในขั้นตอนนี้ซอฟต์แวร์ยังคงมีประโยชน์ แต่จะต้องมีการเปลี่ยนแปลงบางอย่างเพื่อให้สามารถใช้งานได้ เช่น แก้ไขข้อบกพร่องและการเปลี่ยนแปลง เพื่อให้สอดคล้องกับสภาพแวดล้อมของซอฟต์แวร์ ไม่มีการเพิ่มเติม </a:t>
+              <a:t>ในขั้นตอนนี้ซอฟต์แวร์ยังคงมีประโยชน์ แต่จะต้องมีการเปลี่ยนแปลงบางอย่างเพื่อให้สามารถใช้งานได้ เช่น </a:t>
+            </a:r>
+          </a:p>
+          <a:p>
+            <a:pPr marL="1427163" lvl="2" indent="-512763"/>
+            <a:r>
+              <a:rPr lang="th-TH" dirty="0">
+                <a:solidFill>
+                  <a:srgbClr val="FF00FF"/>
+                </a:solidFill>
+              </a:rPr>
+              <a:t>แก้ไขข้อบกพร่องและการเปลี่ยนแปลง เพื่อให้สอดคล้องกับสภาพแวดล้อมของซอฟต์แวร์ </a:t>
+            </a:r>
+          </a:p>
+          <a:p>
+            <a:pPr marL="1427163" lvl="2" indent="-512763"/>
+            <a:r>
+              <a:rPr lang="th-TH" dirty="0">
+                <a:solidFill>
+                  <a:srgbClr val="C00000"/>
+                </a:solidFill>
+              </a:rPr>
+              <a:t>ไม่มีการเพิ่มเติม </a:t>
             </a:r>
             <a:r>
               <a:rPr lang="en-US" dirty="0">
                 <a:solidFill>
-                  <a:srgbClr val="FF00FF"/>
+                  <a:srgbClr val="C00000"/>
                 </a:solidFill>
               </a:rPr>
               <a:t>function </a:t>
@@ -25060,14 +25108,14 @@
             <a:r>
               <a:rPr lang="th-TH" dirty="0">
                 <a:solidFill>
-                  <a:srgbClr val="FF00FF"/>
+                  <a:srgbClr val="C00000"/>
                 </a:solidFill>
               </a:rPr>
               <a:t>ใหม่ ๆ </a:t>
             </a:r>
             <a:endParaRPr lang="en-US" dirty="0">
               <a:solidFill>
-                <a:srgbClr val="FF00FF"/>
+                <a:srgbClr val="C00000"/>
               </a:solidFill>
             </a:endParaRPr>
           </a:p>
@@ -25081,6 +25129,35 @@
               </a:rPr>
               <a:t>Phase-out</a:t>
             </a:r>
+            <a:r>
+              <a:rPr lang="th-TH" dirty="0">
+                <a:solidFill>
+                  <a:srgbClr val="3366FF"/>
+                </a:solidFill>
+              </a:rPr>
+              <a:t> (</a:t>
+            </a:r>
+            <a:r>
+              <a:rPr lang="en-US" dirty="0">
+                <a:solidFill>
+                  <a:srgbClr val="3366FF"/>
+                </a:solidFill>
+              </a:rPr>
+              <a:t> --&gt; Retirement</a:t>
+            </a:r>
+            <a:r>
+              <a:rPr lang="th-TH" dirty="0">
+                <a:solidFill>
+                  <a:srgbClr val="3366FF"/>
+                </a:solidFill>
+              </a:rPr>
+              <a:t>)</a:t>
+            </a:r>
+            <a:endParaRPr lang="en-US" dirty="0">
+              <a:solidFill>
+                <a:srgbClr val="3366FF"/>
+              </a:solidFill>
+            </a:endParaRPr>
           </a:p>
           <a:p>
             <a:pPr marL="969963" lvl="1" indent="-512763"/>
@@ -25090,7 +25167,15 @@
                   <a:srgbClr val="FF00FF"/>
                 </a:solidFill>
               </a:rPr>
-              <a:t>ซอฟต์แวร์อาจยังคงใช้อยู่ แต่จะไม่มีการเปลี่ยนแปลงใด ๆ อีกแล้ว</a:t>
+              <a:t>ซอฟต์แวร์อาจยังคงใช้อยู่ </a:t>
+            </a:r>
+            <a:r>
+              <a:rPr lang="th-TH" dirty="0">
+                <a:solidFill>
+                  <a:srgbClr val="C00000"/>
+                </a:solidFill>
+              </a:rPr>
+              <a:t>แต่จะไม่มีการเปลี่ยนแปลงใด ๆ อีกแล้ว</a:t>
             </a:r>
           </a:p>
         </p:txBody>
@@ -25147,7 +25232,7 @@
           <a:p>
             <a:r>
               <a:rPr lang="th-TH"/>
-              <a:t>2561.11.20</a:t>
+              <a:t>2562.11.08</a:t>
             </a:r>
             <a:endParaRPr lang="th-TH" dirty="0"/>
           </a:p>
@@ -25302,7 +25387,7 @@
           <a:p>
             <a:r>
               <a:rPr lang="th-TH"/>
-              <a:t>2561.11.20</a:t>
+              <a:t>2562.11.08</a:t>
             </a:r>
             <a:endParaRPr lang="th-TH" dirty="0"/>
           </a:p>
@@ -25495,7 +25580,7 @@
           <a:p>
             <a:r>
               <a:rPr lang="th-TH"/>
-              <a:t>2561.11.20</a:t>
+              <a:t>2562.11.08</a:t>
             </a:r>
             <a:endParaRPr lang="th-TH" dirty="0"/>
           </a:p>

</xml_diff>